<commit_message>
used some poster content in thesis
</commit_message>
<xml_diff>
--- a/Poster presentation/Poster_EMAG2016.pptx
+++ b/Poster presentation/Poster_EMAG2016.pptx
@@ -1552,8 +1552,8 @@
           </a:p>
         </p:txBody>
       </p:sp>
-      <mc:AlternateContent xmlns:mc="http://schemas.openxmlformats.org/markup-compatibility/2006">
-        <mc:Choice xmlns:a14="http://schemas.microsoft.com/office/drawing/2010/main" Requires="a14">
+      <mc:AlternateContent xmlns:mc="http://schemas.openxmlformats.org/markup-compatibility/2006" xmlns:a14="http://schemas.microsoft.com/office/drawing/2010/main">
+        <mc:Choice Requires="a14">
           <p:sp>
             <p:nvSpPr>
               <p:cNvPr id="9" name="TextBox 8"/>
@@ -1820,7 +1820,7 @@
             </p:txBody>
           </p:sp>
         </mc:Choice>
-        <mc:Fallback>
+        <mc:Fallback xmlns="">
           <p:sp>
             <p:nvSpPr>
               <p:cNvPr id="9" name="TextBox 8"/>
@@ -2664,8 +2664,8 @@
           </a:p>
         </p:txBody>
       </p:sp>
-      <mc:AlternateContent xmlns:mc="http://schemas.openxmlformats.org/markup-compatibility/2006" xmlns:a14="http://schemas.microsoft.com/office/drawing/2010/main">
-        <mc:Choice Requires="a14">
+      <mc:AlternateContent xmlns:mc="http://schemas.openxmlformats.org/markup-compatibility/2006">
+        <mc:Choice xmlns:a14="http://schemas.microsoft.com/office/drawing/2010/main" Requires="a14">
           <p:sp>
             <p:nvSpPr>
               <p:cNvPr id="30" name="TextBox 29"/>
@@ -2721,7 +2721,7 @@
                       <m:sSubPr>
                         <m:ctrlPr>
                           <a:rPr lang="en-US" sz="2600" i="1" dirty="0" smtClean="0">
-                            <a:latin typeface="Cambria Math" panose="02040503050406030204" pitchFamily="18" charset="0"/>
+                            <a:latin typeface="Cambria Math" charset="0"/>
                           </a:rPr>
                         </m:ctrlPr>
                       </m:sSubPr>
@@ -2762,7 +2762,7 @@
                       <m:sSubPr>
                         <m:ctrlPr>
                           <a:rPr lang="en-US" sz="2600" i="1" dirty="0" smtClean="0">
-                            <a:latin typeface="Cambria Math" panose="02040503050406030204" pitchFamily="18" charset="0"/>
+                            <a:latin typeface="Cambria Math" charset="0"/>
                           </a:rPr>
                         </m:ctrlPr>
                       </m:sSubPr>
@@ -2827,7 +2827,7 @@
                       <m:sSubPr>
                         <m:ctrlPr>
                           <a:rPr lang="en-GB" sz="2600" i="1">
-                            <a:latin typeface="Cambria Math" panose="02040503050406030204" pitchFamily="18" charset="0"/>
+                            <a:latin typeface="Cambria Math" charset="0"/>
                           </a:rPr>
                         </m:ctrlPr>
                       </m:sSubPr>
@@ -2869,7 +2869,7 @@
                         <m:sSubPr>
                           <m:ctrlPr>
                             <a:rPr lang="en-GB" sz="2600" b="0" i="1" smtClean="0">
-                              <a:latin typeface="Cambria Math" panose="02040503050406030204" pitchFamily="18" charset="0"/>
+                              <a:latin typeface="Cambria Math" charset="0"/>
                             </a:rPr>
                           </m:ctrlPr>
                         </m:sSubPr>
@@ -2900,7 +2900,7 @@
                         <m:fPr>
                           <m:ctrlPr>
                             <a:rPr lang="en-GB" sz="2600" b="0" i="1" smtClean="0">
-                              <a:latin typeface="Cambria Math" panose="02040503050406030204" pitchFamily="18" charset="0"/>
+                              <a:latin typeface="Cambria Math" charset="0"/>
                             </a:rPr>
                           </m:ctrlPr>
                         </m:fPr>
@@ -2909,7 +2909,7 @@
                             <m:dPr>
                               <m:ctrlPr>
                                 <a:rPr lang="en-GB" sz="2600" i="1">
-                                  <a:latin typeface="Cambria Math" panose="02040503050406030204" pitchFamily="18" charset="0"/>
+                                  <a:latin typeface="Cambria Math" charset="0"/>
                                 </a:rPr>
                               </m:ctrlPr>
                             </m:dPr>
@@ -2918,7 +2918,7 @@
                                 <m:sSubPr>
                                   <m:ctrlPr>
                                     <a:rPr lang="en-GB" sz="2600" i="1">
-                                      <a:latin typeface="Cambria Math" panose="02040503050406030204" pitchFamily="18" charset="0"/>
+                                      <a:latin typeface="Cambria Math" charset="0"/>
                                     </a:rPr>
                                   </m:ctrlPr>
                                 </m:sSubPr>
@@ -2950,7 +2950,7 @@
                                   <m:degHide m:val="on"/>
                                   <m:ctrlPr>
                                     <a:rPr lang="en-GB" sz="2600" i="1">
-                                      <a:latin typeface="Cambria Math" panose="02040503050406030204" pitchFamily="18" charset="0"/>
+                                      <a:latin typeface="Cambria Math" charset="0"/>
                                     </a:rPr>
                                   </m:ctrlPr>
                                 </m:radPr>
@@ -2960,7 +2960,7 @@
                                     <m:sSubPr>
                                       <m:ctrlPr>
                                         <a:rPr lang="en-GB" sz="2600" i="1">
-                                          <a:latin typeface="Cambria Math" panose="02040503050406030204" pitchFamily="18" charset="0"/>
+                                          <a:latin typeface="Cambria Math" charset="0"/>
                                         </a:rPr>
                                       </m:ctrlPr>
                                     </m:sSubPr>
@@ -2985,7 +2985,7 @@
                                     <m:dPr>
                                       <m:ctrlPr>
                                         <a:rPr lang="en-GB" sz="2600" i="1">
-                                          <a:latin typeface="Cambria Math" panose="02040503050406030204" pitchFamily="18" charset="0"/>
+                                          <a:latin typeface="Cambria Math" charset="0"/>
                                         </a:rPr>
                                       </m:ctrlPr>
                                     </m:dPr>
@@ -3021,7 +3021,7 @@
                             <m:dPr>
                               <m:ctrlPr>
                                 <a:rPr lang="en-GB" sz="2600" i="1">
-                                  <a:latin typeface="Cambria Math" panose="02040503050406030204" pitchFamily="18" charset="0"/>
+                                  <a:latin typeface="Cambria Math" charset="0"/>
                                 </a:rPr>
                               </m:ctrlPr>
                             </m:dPr>
@@ -3030,7 +3030,7 @@
                                 <m:sSubPr>
                                   <m:ctrlPr>
                                     <a:rPr lang="en-GB" sz="2600" i="1">
-                                      <a:latin typeface="Cambria Math" panose="02040503050406030204" pitchFamily="18" charset="0"/>
+                                      <a:latin typeface="Cambria Math" charset="0"/>
                                     </a:rPr>
                                   </m:ctrlPr>
                                 </m:sSubPr>
@@ -3062,7 +3062,7 @@
                                   <m:degHide m:val="on"/>
                                   <m:ctrlPr>
                                     <a:rPr lang="en-GB" sz="2600" i="1">
-                                      <a:latin typeface="Cambria Math" panose="02040503050406030204" pitchFamily="18" charset="0"/>
+                                      <a:latin typeface="Cambria Math" charset="0"/>
                                     </a:rPr>
                                   </m:ctrlPr>
                                 </m:radPr>
@@ -3072,7 +3072,7 @@
                                     <m:sSubPr>
                                       <m:ctrlPr>
                                         <a:rPr lang="en-GB" sz="2600" i="1">
-                                          <a:latin typeface="Cambria Math" panose="02040503050406030204" pitchFamily="18" charset="0"/>
+                                          <a:latin typeface="Cambria Math" charset="0"/>
                                         </a:rPr>
                                       </m:ctrlPr>
                                     </m:sSubPr>
@@ -3097,7 +3097,7 @@
                                     <m:dPr>
                                       <m:ctrlPr>
                                         <a:rPr lang="en-GB" sz="2600" i="1">
-                                          <a:latin typeface="Cambria Math" panose="02040503050406030204" pitchFamily="18" charset="0"/>
+                                          <a:latin typeface="Cambria Math" charset="0"/>
                                         </a:rPr>
                                       </m:ctrlPr>
                                     </m:dPr>
@@ -3152,7 +3152,7 @@
                         <m:degHide m:val="on"/>
                         <m:ctrlPr>
                           <a:rPr lang="en-GB" sz="2600" i="1">
-                            <a:latin typeface="Cambria Math" panose="02040503050406030204" pitchFamily="18" charset="0"/>
+                            <a:latin typeface="Cambria Math" charset="0"/>
                           </a:rPr>
                         </m:ctrlPr>
                       </m:radPr>
@@ -3162,7 +3162,7 @@
                           <m:sSubPr>
                             <m:ctrlPr>
                               <a:rPr lang="en-GB" sz="2600" i="1">
-                                <a:latin typeface="Cambria Math" panose="02040503050406030204" pitchFamily="18" charset="0"/>
+                                <a:latin typeface="Cambria Math" charset="0"/>
                               </a:rPr>
                             </m:ctrlPr>
                           </m:sSubPr>
@@ -3187,7 +3187,7 @@
                           <m:dPr>
                             <m:ctrlPr>
                               <a:rPr lang="en-GB" sz="2600" i="1">
-                                <a:latin typeface="Cambria Math" panose="02040503050406030204" pitchFamily="18" charset="0"/>
+                                <a:latin typeface="Cambria Math" charset="0"/>
                               </a:rPr>
                             </m:ctrlPr>
                           </m:dPr>
@@ -3217,7 +3217,7 @@
                         <m:degHide m:val="on"/>
                         <m:ctrlPr>
                           <a:rPr lang="en-GB" sz="2600" i="1">
-                            <a:latin typeface="Cambria Math" panose="02040503050406030204" pitchFamily="18" charset="0"/>
+                            <a:latin typeface="Cambria Math" charset="0"/>
                           </a:rPr>
                         </m:ctrlPr>
                       </m:radPr>
@@ -3227,7 +3227,7 @@
                           <m:sSubPr>
                             <m:ctrlPr>
                               <a:rPr lang="en-GB" sz="2600" i="1">
-                                <a:latin typeface="Cambria Math" panose="02040503050406030204" pitchFamily="18" charset="0"/>
+                                <a:latin typeface="Cambria Math" charset="0"/>
                               </a:rPr>
                             </m:ctrlPr>
                           </m:sSubPr>
@@ -3252,7 +3252,7 @@
                           <m:dPr>
                             <m:ctrlPr>
                               <a:rPr lang="en-GB" sz="2600" i="1">
-                                <a:latin typeface="Cambria Math" panose="02040503050406030204" pitchFamily="18" charset="0"/>
+                                <a:latin typeface="Cambria Math" charset="0"/>
                               </a:rPr>
                             </m:ctrlPr>
                           </m:dPr>
@@ -3296,7 +3296,7 @@
                       <m:sSubPr>
                         <m:ctrlPr>
                           <a:rPr lang="en-US" sz="2600" i="1" smtClean="0">
-                            <a:latin typeface="Cambria Math" panose="02040503050406030204" pitchFamily="18" charset="0"/>
+                            <a:latin typeface="Cambria Math" charset="0"/>
                           </a:rPr>
                         </m:ctrlPr>
                       </m:sSubPr>
@@ -3331,7 +3331,7 @@
                       <m:sSubPr>
                         <m:ctrlPr>
                           <a:rPr lang="en-US" sz="2600" i="1">
-                            <a:latin typeface="Cambria Math" panose="02040503050406030204" pitchFamily="18" charset="0"/>
+                            <a:latin typeface="Cambria Math" charset="0"/>
                           </a:rPr>
                         </m:ctrlPr>
                       </m:sSubPr>
@@ -3379,7 +3379,7 @@
                         <m:sSubPr>
                           <m:ctrlPr>
                             <a:rPr lang="en-US" sz="2600" i="1">
-                              <a:latin typeface="Cambria Math" panose="02040503050406030204" pitchFamily="18" charset="0"/>
+                              <a:latin typeface="Cambria Math" charset="0"/>
                             </a:rPr>
                           </m:ctrlPr>
                         </m:sSubPr>
@@ -3413,7 +3413,7 @@
                         <m:dPr>
                           <m:ctrlPr>
                             <a:rPr lang="en-GB" sz="2600" i="1">
-                              <a:latin typeface="Cambria Math" panose="02040503050406030204" pitchFamily="18" charset="0"/>
+                              <a:latin typeface="Cambria Math" charset="0"/>
                             </a:rPr>
                           </m:ctrlPr>
                         </m:dPr>
@@ -3422,7 +3422,7 @@
                             <m:sSubPr>
                               <m:ctrlPr>
                                 <a:rPr lang="en-GB" sz="2600" i="1">
-                                  <a:latin typeface="Cambria Math" panose="02040503050406030204" pitchFamily="18" charset="0"/>
+                                  <a:latin typeface="Cambria Math" charset="0"/>
                                 </a:rPr>
                               </m:ctrlPr>
                             </m:sSubPr>
@@ -3454,7 +3454,7 @@
                               <m:degHide m:val="on"/>
                               <m:ctrlPr>
                                 <a:rPr lang="en-GB" sz="2600" i="1">
-                                  <a:latin typeface="Cambria Math" panose="02040503050406030204" pitchFamily="18" charset="0"/>
+                                  <a:latin typeface="Cambria Math" charset="0"/>
                                 </a:rPr>
                               </m:ctrlPr>
                             </m:radPr>
@@ -3464,7 +3464,7 @@
                                 <m:sSubPr>
                                   <m:ctrlPr>
                                     <a:rPr lang="en-GB" sz="2600" i="1">
-                                      <a:latin typeface="Cambria Math" panose="02040503050406030204" pitchFamily="18" charset="0"/>
+                                      <a:latin typeface="Cambria Math" charset="0"/>
                                     </a:rPr>
                                   </m:ctrlPr>
                                 </m:sSubPr>
@@ -3489,7 +3489,7 @@
                                 <m:dPr>
                                   <m:ctrlPr>
                                     <a:rPr lang="en-GB" sz="2600" i="1">
-                                      <a:latin typeface="Cambria Math" panose="02040503050406030204" pitchFamily="18" charset="0"/>
+                                      <a:latin typeface="Cambria Math" charset="0"/>
                                     </a:rPr>
                                   </m:ctrlPr>
                                 </m:dPr>
@@ -3525,7 +3525,7 @@
                         <m:sSubPr>
                           <m:ctrlPr>
                             <a:rPr lang="en-GB" sz="2600" i="1">
-                              <a:latin typeface="Cambria Math" panose="02040503050406030204" pitchFamily="18" charset="0"/>
+                              <a:latin typeface="Cambria Math" charset="0"/>
                             </a:rPr>
                           </m:ctrlPr>
                         </m:sSubPr>
@@ -3565,7 +3565,7 @@
                         <m:sSubPr>
                           <m:ctrlPr>
                             <a:rPr lang="en-US" sz="2600" i="1">
-                              <a:latin typeface="Cambria Math" panose="02040503050406030204" pitchFamily="18" charset="0"/>
+                              <a:latin typeface="Cambria Math" charset="0"/>
                             </a:rPr>
                           </m:ctrlPr>
                         </m:sSubPr>
@@ -3599,7 +3599,7 @@
                         <m:sSubPr>
                           <m:ctrlPr>
                             <a:rPr lang="en-GB" sz="2600" i="1">
-                              <a:latin typeface="Cambria Math" panose="02040503050406030204" pitchFamily="18" charset="0"/>
+                              <a:latin typeface="Cambria Math" charset="0"/>
                             </a:rPr>
                           </m:ctrlPr>
                         </m:sSubPr>
@@ -3630,7 +3630,7 @@
                         <m:dPr>
                           <m:ctrlPr>
                             <a:rPr lang="en-GB" sz="2600" i="1">
-                              <a:latin typeface="Cambria Math" panose="02040503050406030204" pitchFamily="18" charset="0"/>
+                              <a:latin typeface="Cambria Math" charset="0"/>
                             </a:rPr>
                           </m:ctrlPr>
                         </m:dPr>
@@ -3639,7 +3639,7 @@
                             <m:sSubPr>
                               <m:ctrlPr>
                                 <a:rPr lang="en-GB" sz="2600" i="1">
-                                  <a:latin typeface="Cambria Math" panose="02040503050406030204" pitchFamily="18" charset="0"/>
+                                  <a:latin typeface="Cambria Math" charset="0"/>
                                 </a:rPr>
                               </m:ctrlPr>
                             </m:sSubPr>
@@ -3671,7 +3671,7 @@
                               <m:degHide m:val="on"/>
                               <m:ctrlPr>
                                 <a:rPr lang="en-GB" sz="2600" i="1">
-                                  <a:latin typeface="Cambria Math" panose="02040503050406030204" pitchFamily="18" charset="0"/>
+                                  <a:latin typeface="Cambria Math" charset="0"/>
                                 </a:rPr>
                               </m:ctrlPr>
                             </m:radPr>
@@ -3681,7 +3681,7 @@
                                 <m:sSubPr>
                                   <m:ctrlPr>
                                     <a:rPr lang="en-GB" sz="2600" i="1">
-                                      <a:latin typeface="Cambria Math" panose="02040503050406030204" pitchFamily="18" charset="0"/>
+                                      <a:latin typeface="Cambria Math" charset="0"/>
                                     </a:rPr>
                                   </m:ctrlPr>
                                 </m:sSubPr>
@@ -3706,7 +3706,7 @@
                                 <m:dPr>
                                   <m:ctrlPr>
                                     <a:rPr lang="en-GB" sz="2600" i="1">
-                                      <a:latin typeface="Cambria Math" panose="02040503050406030204" pitchFamily="18" charset="0"/>
+                                      <a:latin typeface="Cambria Math" charset="0"/>
                                     </a:rPr>
                                   </m:ctrlPr>
                                 </m:dPr>
@@ -3751,7 +3751,19 @@
                   <a:rPr lang="en-US" sz="2600" dirty="0" smtClean="0">
                     <a:latin typeface="TUOS Blake" pitchFamily="34" charset="0"/>
                   </a:rPr>
-                  <a:t>The error bars associated with optimal background are smaller when compared to Poissonian statistics.</a:t>
+                  <a:t>The error bars associated with optimal background are smaller when compared to </a:t>
+                </a:r>
+                <a:r>
+                  <a:rPr lang="en-US" sz="2600" dirty="0" err="1" smtClean="0">
+                    <a:latin typeface="TUOS Blake" pitchFamily="34" charset="0"/>
+                  </a:rPr>
+                  <a:t>Poissonian</a:t>
+                </a:r>
+                <a:r>
+                  <a:rPr lang="en-US" sz="2600" dirty="0" smtClean="0">
+                    <a:latin typeface="TUOS Blake" pitchFamily="34" charset="0"/>
+                  </a:rPr>
+                  <a:t> statistics.</a:t>
                 </a:r>
               </a:p>
               <a:p>
@@ -3768,11 +3780,14 @@
                   </a:rPr>
                   <a:t>The quantification of the Ga/As ratio in GaAs is close to unity with less systematic and statistical errors.</a:t>
                 </a:r>
+                <a:endParaRPr lang="en-US" sz="2600" dirty="0" smtClean="0">
+                  <a:latin typeface="TUOS Blake" pitchFamily="34" charset="0"/>
+                </a:endParaRPr>
               </a:p>
             </p:txBody>
           </p:sp>
         </mc:Choice>
-        <mc:Fallback xmlns="">
+        <mc:Fallback>
           <p:sp>
             <p:nvSpPr>
               <p:cNvPr id="30" name="TextBox 29"/>
@@ -3792,7 +3807,7 @@
               <a:blipFill rotWithShape="0">
                 <a:blip r:embed="rId6"/>
                 <a:stretch>
-                  <a:fillRect l="-1007" t="-966" r="-1007" b="-759"/>
+                  <a:fillRect l="-1007" t="-897" r="-1007" b="-828"/>
                 </a:stretch>
               </a:blipFill>
               <a:ln>
@@ -3806,7 +3821,7 @@
               <a:lstStyle/>
               <a:p>
                 <a:r>
-                  <a:rPr lang="en-GB">
+                  <a:rPr lang="en-US">
                     <a:noFill/>
                   </a:rPr>
                   <a:t> </a:t>

</xml_diff>